<commit_message>
evo: TBS merged fields
</commit_message>
<xml_diff>
--- a/templates/trunk/templates/styles/office/demo_presentation_msoffice.pptx
+++ b/templates/trunk/templates/styles/office/demo_presentation_msoffice.pptx
@@ -288,7 +288,7 @@
           <a:p>
             <a:fld id="{AA309A6D-C09C-4548-B29A-6CF363A7E532}" type="datetimeFigureOut">
               <a:rPr lang="fr-FR" smtClean="0"/>
-              <a:t>30/03/2012</a:t>
+              <a:t>08/04/2012</a:t>
             </a:fld>
             <a:endParaRPr lang="fr-BE"/>
           </a:p>
@@ -453,7 +453,7 @@
           <a:p>
             <a:fld id="{AA309A6D-C09C-4548-B29A-6CF363A7E532}" type="datetimeFigureOut">
               <a:rPr lang="fr-FR" smtClean="0"/>
-              <a:t>30/03/2012</a:t>
+              <a:t>08/04/2012</a:t>
             </a:fld>
             <a:endParaRPr lang="fr-BE"/>
           </a:p>
@@ -628,7 +628,7 @@
           <a:p>
             <a:fld id="{AA309A6D-C09C-4548-B29A-6CF363A7E532}" type="datetimeFigureOut">
               <a:rPr lang="fr-FR" smtClean="0"/>
-              <a:t>30/03/2012</a:t>
+              <a:t>08/04/2012</a:t>
             </a:fld>
             <a:endParaRPr lang="fr-BE"/>
           </a:p>
@@ -793,7 +793,7 @@
           <a:p>
             <a:fld id="{AA309A6D-C09C-4548-B29A-6CF363A7E532}" type="datetimeFigureOut">
               <a:rPr lang="fr-FR" smtClean="0"/>
-              <a:t>30/03/2012</a:t>
+              <a:t>08/04/2012</a:t>
             </a:fld>
             <a:endParaRPr lang="fr-BE"/>
           </a:p>
@@ -1034,7 +1034,7 @@
           <a:p>
             <a:fld id="{AA309A6D-C09C-4548-B29A-6CF363A7E532}" type="datetimeFigureOut">
               <a:rPr lang="fr-FR" smtClean="0"/>
-              <a:t>30/03/2012</a:t>
+              <a:t>08/04/2012</a:t>
             </a:fld>
             <a:endParaRPr lang="fr-BE"/>
           </a:p>
@@ -1317,7 +1317,7 @@
           <a:p>
             <a:fld id="{AA309A6D-C09C-4548-B29A-6CF363A7E532}" type="datetimeFigureOut">
               <a:rPr lang="fr-FR" smtClean="0"/>
-              <a:t>30/03/2012</a:t>
+              <a:t>08/04/2012</a:t>
             </a:fld>
             <a:endParaRPr lang="fr-BE"/>
           </a:p>
@@ -1734,7 +1734,7 @@
           <a:p>
             <a:fld id="{AA309A6D-C09C-4548-B29A-6CF363A7E532}" type="datetimeFigureOut">
               <a:rPr lang="fr-FR" smtClean="0"/>
-              <a:t>30/03/2012</a:t>
+              <a:t>08/04/2012</a:t>
             </a:fld>
             <a:endParaRPr lang="fr-BE"/>
           </a:p>
@@ -1847,7 +1847,7 @@
           <a:p>
             <a:fld id="{AA309A6D-C09C-4548-B29A-6CF363A7E532}" type="datetimeFigureOut">
               <a:rPr lang="fr-FR" smtClean="0"/>
-              <a:t>30/03/2012</a:t>
+              <a:t>08/04/2012</a:t>
             </a:fld>
             <a:endParaRPr lang="fr-BE"/>
           </a:p>
@@ -1937,7 +1937,7 @@
           <a:p>
             <a:fld id="{AA309A6D-C09C-4548-B29A-6CF363A7E532}" type="datetimeFigureOut">
               <a:rPr lang="fr-FR" smtClean="0"/>
-              <a:t>30/03/2012</a:t>
+              <a:t>08/04/2012</a:t>
             </a:fld>
             <a:endParaRPr lang="fr-BE"/>
           </a:p>
@@ -2209,7 +2209,7 @@
           <a:p>
             <a:fld id="{AA309A6D-C09C-4548-B29A-6CF363A7E532}" type="datetimeFigureOut">
               <a:rPr lang="fr-FR" smtClean="0"/>
-              <a:t>30/03/2012</a:t>
+              <a:t>08/04/2012</a:t>
             </a:fld>
             <a:endParaRPr lang="fr-BE"/>
           </a:p>
@@ -2457,7 +2457,7 @@
           <a:p>
             <a:fld id="{AA309A6D-C09C-4548-B29A-6CF363A7E532}" type="datetimeFigureOut">
               <a:rPr lang="fr-FR" smtClean="0"/>
-              <a:t>30/03/2012</a:t>
+              <a:t>08/04/2012</a:t>
             </a:fld>
             <a:endParaRPr lang="fr-BE"/>
           </a:p>
@@ -2665,7 +2665,7 @@
           <a:p>
             <a:fld id="{AA309A6D-C09C-4548-B29A-6CF363A7E532}" type="datetimeFigureOut">
               <a:rPr lang="fr-FR" smtClean="0"/>
-              <a:t>30/03/2012</a:t>
+              <a:t>08/04/2012</a:t>
             </a:fld>
             <a:endParaRPr lang="fr-BE"/>
           </a:p>
@@ -3050,10 +3050,6 @@
           <a:bodyPr/>
           <a:lstStyle/>
           <a:p>
-            <a:r>
-              <a:rPr lang="fr-FR" smtClean="0"/>
-              <a:t>MAARCH</a:t>
-            </a:r>
             <a:endParaRPr lang="fr-FR" dirty="0"/>
           </a:p>
         </p:txBody>
@@ -3070,13 +3066,48 @@
         </p:nvSpPr>
         <p:spPr/>
         <p:txBody>
-          <a:bodyPr/>
-          <a:lstStyle/>
-          <a:p>
-            <a:endParaRPr lang="fr-FR"/>
-          </a:p>
-        </p:txBody>
-      </p:sp>
+          <a:bodyPr>
+            <a:normAutofit/>
+          </a:bodyPr>
+          <a:lstStyle/>
+          <a:p>
+            <a:endParaRPr lang="en-US" dirty="0"/>
+          </a:p>
+        </p:txBody>
+      </p:sp>
+      <p:pic>
+        <p:nvPicPr>
+          <p:cNvPr id="4" name="Image 3"/>
+          <p:cNvPicPr/>
+          <p:nvPr/>
+        </p:nvPicPr>
+        <p:blipFill>
+          <a:blip r:embed="rId2">
+            <a:extLst>
+              <a:ext uri="{28A0092B-C50C-407E-A947-70E740481C1C}">
+                <a14:useLocalDpi xmlns:a14="http://schemas.microsoft.com/office/drawing/2010/main" val="0"/>
+              </a:ext>
+            </a:extLst>
+          </a:blip>
+          <a:srcRect/>
+          <a:stretch>
+            <a:fillRect/>
+          </a:stretch>
+        </p:blipFill>
+        <p:spPr bwMode="auto">
+          <a:xfrm>
+            <a:off x="3750150" y="3140968"/>
+            <a:ext cx="1541145" cy="480060"/>
+          </a:xfrm>
+          <a:prstGeom prst="rect">
+            <a:avLst/>
+          </a:prstGeom>
+          <a:noFill/>
+          <a:ln>
+            <a:noFill/>
+          </a:ln>
+        </p:spPr>
+      </p:pic>
     </p:spTree>
     <p:extLst>
       <p:ext uri="{BB962C8B-B14F-4D97-AF65-F5344CB8AC3E}">

</xml_diff>